<commit_message>
number theory & week 5
</commit_message>
<xml_diff>
--- a/spring11/slides11/slides4w.pptx
+++ b/spring11/slides11/slides4w.pptx
@@ -317,7 +317,7 @@
               <a:pPr>
                 <a:defRPr/>
               </a:pPr>
-              <a:t>2/22/11</a:t>
+              <a:t>2/24/11</a:t>
             </a:fld>
             <a:endParaRPr lang="en-US"/>
           </a:p>
@@ -515,7 +515,7 @@
               <a:pPr>
                 <a:defRPr/>
               </a:pPr>
-              <a:t>2/22/11</a:t>
+              <a:t>2/24/11</a:t>
             </a:fld>
             <a:endParaRPr lang="en-US"/>
           </a:p>
@@ -33166,7 +33166,14 @@
                 <a:latin typeface="Courier New"/>
                 <a:cs typeface="Courier New"/>
               </a:rPr>
-              <a:t>X,Y,Z</a:t>
+              <a:t>X,Y,</a:t>
+            </a:r>
+            <a:r>
+              <a:rPr lang="en-US" sz="3600" b="1" dirty="0" smtClean="0">
+                <a:latin typeface="Courier New"/>
+                <a:cs typeface="Courier New"/>
+              </a:rPr>
+              <a:t>Z,R</a:t>
             </a:r>
           </a:p>
           <a:p>
@@ -34744,14 +34751,7 @@
                 <a:latin typeface="Courier New"/>
                 <a:cs typeface="Courier New"/>
               </a:rPr>
-              <a:t>=</a:t>
-            </a:r>
-            <a:r>
-              <a:rPr lang="en-US" sz="4800" dirty="0" smtClean="0">
-                <a:latin typeface="Courier New"/>
-                <a:cs typeface="Courier New"/>
-              </a:rPr>
-              <a:t> </a:t>
+              <a:t>= </a:t>
             </a:r>
             <a:r>
               <a:rPr lang="en-US" sz="4400" dirty="0" err="1" smtClean="0">
@@ -35310,11 +35310,7 @@
             </a:r>
             <a:r>
               <a:rPr lang="en-US" sz="5400" dirty="0" smtClean="0"/>
-              <a:t> =</a:t>
-            </a:r>
-            <a:r>
-              <a:rPr lang="en-US" sz="5400" dirty="0" smtClean="0"/>
-              <a:t> </a:t>
+              <a:t> = </a:t>
             </a:r>
             <a:r>
               <a:rPr lang="en-US" sz="5400" dirty="0" err="1" smtClean="0">
@@ -35390,11 +35386,7 @@
             </a:r>
             <a:r>
               <a:rPr lang="en-US" sz="6600" dirty="0" smtClean="0"/>
-              <a:t> =</a:t>
-            </a:r>
-            <a:r>
-              <a:rPr lang="en-US" sz="6600" dirty="0" smtClean="0"/>
-              <a:t> </a:t>
+              <a:t> = </a:t>
             </a:r>
             <a:r>
               <a:rPr lang="en-US" sz="6600" dirty="0" err="1" smtClean="0">

</xml_diff>